<commit_message>
Agregado de imagenes a la generacion del PPT
</commit_message>
<xml_diff>
--- a/templates/template.pptx
+++ b/templates/template.pptx
@@ -5,14 +5,11 @@
     <p:sldMasterId id="2147483648" r:id="rId4"/>
   </p:sldMasterIdLst>
   <p:notesMasterIdLst>
-    <p:notesMasterId r:id="rId6"/>
+    <p:notesMasterId r:id="rId5"/>
   </p:notesMasterIdLst>
   <p:handoutMasterIdLst>
-    <p:handoutMasterId r:id="rId7"/>
+    <p:handoutMasterId r:id="rId6"/>
   </p:handoutMasterIdLst>
-  <p:sldIdLst>
-    <p:sldId id="11827974" r:id="rId5"/>
-  </p:sldIdLst>
   <p:sldSz cx="12192000" cy="6858000"/>
   <p:notesSz cx="6858000" cy="9144000"/>
   <p:defaultTextStyle>
@@ -124,6 +121,9 @@
           </p15:clr>
         </p15:guide>
       </p15:sldGuideLst>
+    </p:ext>
+    <p:ext uri="{2D200454-40CA-4A62-9FC3-DE9A4176ACB9}">
+      <p15:notesGuideLst xmlns:p15="http://schemas.microsoft.com/office/powerpoint/2012/main"/>
     </p:ext>
   </p:extLst>
 </p:presentation>
@@ -2300,86 +2300,6 @@
     </p:otherStyle>
   </p:txStyles>
 </p:sldMaster>
-</file>
-
-<file path=ppt/slides/slide1.xml><?xml version="1.0" encoding="utf-8"?>
-<p:sld xmlns:a="http://schemas.openxmlformats.org/drawingml/2006/main" xmlns:r="http://schemas.openxmlformats.org/officeDocument/2006/relationships" xmlns:p="http://schemas.openxmlformats.org/presentationml/2006/main">
-  <p:cSld>
-    <p:spTree>
-      <p:nvGrpSpPr>
-        <p:cNvPr id="1" name=""/>
-        <p:cNvGrpSpPr/>
-        <p:nvPr/>
-      </p:nvGrpSpPr>
-      <p:grpSpPr>
-        <a:xfrm>
-          <a:off x="0" y="0"/>
-          <a:ext cx="0" cy="0"/>
-          <a:chOff x="0" y="0"/>
-          <a:chExt cx="0" cy="0"/>
-        </a:xfrm>
-      </p:grpSpPr>
-      <p:sp>
-        <p:nvSpPr>
-          <p:cNvPr id="2" name="Título 1">
-            <a:extLst>
-              <a:ext uri="{FF2B5EF4-FFF2-40B4-BE49-F238E27FC236}">
-                <a16:creationId xmlns:a16="http://schemas.microsoft.com/office/drawing/2014/main" id="{6D6AC3B7-3EC5-C77F-B603-704506390730}"/>
-              </a:ext>
-            </a:extLst>
-          </p:cNvPr>
-          <p:cNvSpPr>
-            <a:spLocks noGrp="1"/>
-          </p:cNvSpPr>
-          <p:nvPr>
-            <p:ph type="ctrTitle"/>
-          </p:nvPr>
-        </p:nvSpPr>
-        <p:spPr/>
-        <p:txBody>
-          <a:bodyPr/>
-          <a:lstStyle/>
-          <a:p>
-            <a:endParaRPr lang="es-PE"/>
-          </a:p>
-        </p:txBody>
-      </p:sp>
-      <p:sp>
-        <p:nvSpPr>
-          <p:cNvPr id="3" name="Subtítulo 2">
-            <a:extLst>
-              <a:ext uri="{FF2B5EF4-FFF2-40B4-BE49-F238E27FC236}">
-                <a16:creationId xmlns:a16="http://schemas.microsoft.com/office/drawing/2014/main" id="{C654BA03-801E-06CB-886C-94A8BDC37B0F}"/>
-              </a:ext>
-            </a:extLst>
-          </p:cNvPr>
-          <p:cNvSpPr>
-            <a:spLocks noGrp="1"/>
-          </p:cNvSpPr>
-          <p:nvPr>
-            <p:ph type="subTitle" idx="1"/>
-          </p:nvPr>
-        </p:nvSpPr>
-        <p:spPr/>
-        <p:txBody>
-          <a:bodyPr/>
-          <a:lstStyle/>
-          <a:p>
-            <a:endParaRPr lang="es-PE"/>
-          </a:p>
-        </p:txBody>
-      </p:sp>
-    </p:spTree>
-    <p:extLst>
-      <p:ext uri="{BB962C8B-B14F-4D97-AF65-F5344CB8AC3E}">
-        <p14:creationId xmlns:p14="http://schemas.microsoft.com/office/powerpoint/2010/main" val="3118052583"/>
-      </p:ext>
-    </p:extLst>
-  </p:cSld>
-  <p:clrMapOvr>
-    <a:masterClrMapping/>
-  </p:clrMapOvr>
-</p:sld>
 </file>
 
 <file path=ppt/theme/theme1.xml><?xml version="1.0" encoding="utf-8"?>
@@ -3220,15 +3140,6 @@
 </file>
 
 <file path=customXml/item1.xml><?xml version="1.0" encoding="utf-8"?>
-<?mso-contentType ?>
-<FormTemplates xmlns="http://schemas.microsoft.com/sharepoint/v3/contenttype/forms">
-  <Display>DocumentLibraryForm</Display>
-  <Edit>DocumentLibraryForm</Edit>
-  <New>DocumentLibraryForm</New>
-</FormTemplates>
-</file>
-
-<file path=customXml/item2.xml><?xml version="1.0" encoding="utf-8"?>
 <ct:contentTypeSchema xmlns:ct="http://schemas.microsoft.com/office/2006/metadata/contentType" xmlns:ma="http://schemas.microsoft.com/office/2006/metadata/properties/metaAttributes" ct:_="" ma:_="" ma:contentTypeName="Document" ma:contentTypeID="0x010100E55810C717FCB24E93134B111062C4F1" ma:contentTypeVersion="13" ma:contentTypeDescription="Create a new document." ma:contentTypeScope="" ma:versionID="7cb5f257563d2666a987e1f0268f5ac7">
   <xsd:schema xmlns:xsd="http://www.w3.org/2001/XMLSchema" xmlns:xs="http://www.w3.org/2001/XMLSchema" xmlns:p="http://schemas.microsoft.com/office/2006/metadata/properties" xmlns:ns2="f923dddb-0484-4a3c-b964-42bbf99f3400" xmlns:ns3="29da81e6-a6c1-4a47-a056-37f90d0d01b4" targetNamespace="http://schemas.microsoft.com/office/2006/metadata/properties" ma:root="true" ma:fieldsID="354d87e1e2dd931c70572a62bf6bc35a" ns2:_="" ns3:_="">
     <xsd:import namespace="f923dddb-0484-4a3c-b964-42bbf99f3400"/>
@@ -3435,7 +3346,7 @@
 </ct:contentTypeSchema>
 </file>
 
-<file path=customXml/item3.xml><?xml version="1.0" encoding="utf-8"?>
+<file path=customXml/item2.xml><?xml version="1.0" encoding="utf-8"?>
 <p:properties xmlns:p="http://schemas.microsoft.com/office/2006/metadata/properties" xmlns:xsi="http://www.w3.org/2001/XMLSchema-instance" xmlns:pc="http://schemas.microsoft.com/office/infopath/2007/PartnerControls">
   <documentManagement>
     <TaxCatchAll xmlns="29da81e6-a6c1-4a47-a056-37f90d0d01b4" xsi:nil="true"/>
@@ -3446,15 +3357,16 @@
 </p:properties>
 </file>
 
-<file path=customXml/itemProps1.xml><?xml version="1.0" encoding="utf-8"?>
-<ds:datastoreItem xmlns:ds="http://schemas.openxmlformats.org/officeDocument/2006/customXml" ds:itemID="{3B88BAF6-F918-42BA-8235-7E362212CA12}">
-  <ds:schemaRefs>
-    <ds:schemaRef ds:uri="http://schemas.microsoft.com/sharepoint/v3/contenttype/forms"/>
-  </ds:schemaRefs>
-</ds:datastoreItem>
+<file path=customXml/item3.xml><?xml version="1.0" encoding="utf-8"?>
+<?mso-contentType ?>
+<FormTemplates xmlns="http://schemas.microsoft.com/sharepoint/v3/contenttype/forms">
+  <Display>DocumentLibraryForm</Display>
+  <Edit>DocumentLibraryForm</Edit>
+  <New>DocumentLibraryForm</New>
+</FormTemplates>
 </file>
 
-<file path=customXml/itemProps2.xml><?xml version="1.0" encoding="utf-8"?>
+<file path=customXml/itemProps1.xml><?xml version="1.0" encoding="utf-8"?>
 <ds:datastoreItem xmlns:ds="http://schemas.openxmlformats.org/officeDocument/2006/customXml" ds:itemID="{B5C6FDB8-3E2B-413D-B9F6-095CFF42F312}">
   <ds:schemaRefs>
     <ds:schemaRef ds:uri="29da81e6-a6c1-4a47-a056-37f90d0d01b4"/>
@@ -3473,7 +3385,7 @@
 </ds:datastoreItem>
 </file>
 
-<file path=customXml/itemProps3.xml><?xml version="1.0" encoding="utf-8"?>
+<file path=customXml/itemProps2.xml><?xml version="1.0" encoding="utf-8"?>
 <ds:datastoreItem xmlns:ds="http://schemas.openxmlformats.org/officeDocument/2006/customXml" ds:itemID="{BD8E1052-C526-4BE2-ABAB-4FFD9AE6D300}">
   <ds:schemaRefs>
     <ds:schemaRef ds:uri="29da81e6-a6c1-4a47-a056-37f90d0d01b4"/>
@@ -3490,6 +3402,14 @@
 </ds:datastoreItem>
 </file>
 
+<file path=customXml/itemProps3.xml><?xml version="1.0" encoding="utf-8"?>
+<ds:datastoreItem xmlns:ds="http://schemas.openxmlformats.org/officeDocument/2006/customXml" ds:itemID="{3B88BAF6-F918-42BA-8235-7E362212CA12}">
+  <ds:schemaRefs>
+    <ds:schemaRef ds:uri="http://schemas.microsoft.com/sharepoint/v3/contenttype/forms"/>
+  </ds:schemaRefs>
+</ds:datastoreItem>
+</file>
+
 <file path=docMetadata/LabelInfo.xml><?xml version="1.0" encoding="utf-8"?>
 <clbl:labelList xmlns:clbl="http://schemas.microsoft.com/office/2020/mipLabelMetadata">
   <clbl:label id="{3048dc87-43f0-4100-9acb-ae1971c79395}" enabled="0" method="" siteId="{3048dc87-43f0-4100-9acb-ae1971c79395}" removed="1"/>

</xml_diff>

<commit_message>
Insercion de imagen en layout
</commit_message>
<xml_diff>
--- a/templates/template.pptx
+++ b/templates/template.pptx
@@ -1031,7 +1031,7 @@
           <a:bodyPr/>
           <a:lstStyle/>
           <a:p>
-            <a:endParaRPr lang="es-PE"/>
+            <a:endParaRPr lang="es-PE" dirty="0"/>
           </a:p>
         </p:txBody>
       </p:sp>
@@ -1064,40 +1064,37 @@
             <a:pPr marL="0" lvl="0" indent="0">
               <a:buNone/>
             </a:pPr>
+            <a:endParaRPr lang="es-PE" dirty="0"/>
+          </a:p>
+        </p:txBody>
+      </p:sp>
+      <p:sp>
+        <p:nvSpPr>
+          <p:cNvPr id="3" name="Marcador de posición de imagen 2">
+            <a:extLst>
+              <a:ext uri="{FF2B5EF4-FFF2-40B4-BE49-F238E27FC236}">
+                <a16:creationId xmlns:a16="http://schemas.microsoft.com/office/drawing/2014/main" id="{0F6C121F-0ED2-16F4-03B3-BC9C241F6B3C}"/>
+              </a:ext>
+            </a:extLst>
+          </p:cNvPr>
+          <p:cNvSpPr>
+            <a:spLocks noGrp="1"/>
+          </p:cNvSpPr>
+          <p:nvPr>
+            <p:ph type="pic" sz="quarter" idx="10"/>
+          </p:nvPr>
+        </p:nvSpPr>
+        <p:spPr>
+          <a:xfrm>
+            <a:off x="6117158" y="1826327"/>
+            <a:ext cx="5180400" cy="3891600"/>
+          </a:xfrm>
+        </p:spPr>
+        <p:txBody>
+          <a:bodyPr/>
+          <a:lstStyle/>
+          <a:p>
             <a:endParaRPr lang="es-PE"/>
-          </a:p>
-        </p:txBody>
-      </p:sp>
-      <p:sp>
-        <p:nvSpPr>
-          <p:cNvPr id="15" name="Marcador de contenido 7"/>
-          <p:cNvSpPr>
-            <a:spLocks noGrp="1"/>
-          </p:cNvSpPr>
-          <p:nvPr>
-            <p:ph sz="half" idx="2"/>
-          </p:nvPr>
-        </p:nvSpPr>
-        <p:spPr>
-          <a:xfrm>
-            <a:off x="6115958" y="1825625"/>
-            <a:ext cx="5181600" cy="3893004"/>
-          </a:xfrm>
-        </p:spPr>
-        <p:txBody>
-          <a:bodyPr vert="horz" lIns="91440" tIns="45720" rIns="91440" bIns="45720" rtlCol="0">
-            <a:normAutofit/>
-          </a:bodyPr>
-          <a:lstStyle>
-            <a:lvl1pPr>
-              <a:defRPr lang="es-PE" sz="2400" i="0" dirty="0"/>
-            </a:lvl1pPr>
-          </a:lstStyle>
-          <a:p>
-            <a:pPr marL="0" lvl="0" indent="0">
-              <a:buNone/>
-            </a:pPr>
-            <a:endParaRPr lang="es-PE" dirty="0"/>
           </a:p>
         </p:txBody>
       </p:sp>
@@ -3140,6 +3137,17 @@
 </file>
 
 <file path=customXml/item1.xml><?xml version="1.0" encoding="utf-8"?>
+<p:properties xmlns:p="http://schemas.microsoft.com/office/2006/metadata/properties" xmlns:xsi="http://www.w3.org/2001/XMLSchema-instance" xmlns:pc="http://schemas.microsoft.com/office/infopath/2007/PartnerControls">
+  <documentManagement>
+    <TaxCatchAll xmlns="29da81e6-a6c1-4a47-a056-37f90d0d01b4" xsi:nil="true"/>
+    <lcf76f155ced4ddcb4097134ff3c332f xmlns="f923dddb-0484-4a3c-b964-42bbf99f3400">
+      <Terms xmlns="http://schemas.microsoft.com/office/infopath/2007/PartnerControls"/>
+    </lcf76f155ced4ddcb4097134ff3c332f>
+  </documentManagement>
+</p:properties>
+</file>
+
+<file path=customXml/item2.xml><?xml version="1.0" encoding="utf-8"?>
 <ct:contentTypeSchema xmlns:ct="http://schemas.microsoft.com/office/2006/metadata/contentType" xmlns:ma="http://schemas.microsoft.com/office/2006/metadata/properties/metaAttributes" ct:_="" ma:_="" ma:contentTypeName="Document" ma:contentTypeID="0x010100E55810C717FCB24E93134B111062C4F1" ma:contentTypeVersion="13" ma:contentTypeDescription="Create a new document." ma:contentTypeScope="" ma:versionID="7cb5f257563d2666a987e1f0268f5ac7">
   <xsd:schema xmlns:xsd="http://www.w3.org/2001/XMLSchema" xmlns:xs="http://www.w3.org/2001/XMLSchema" xmlns:p="http://schemas.microsoft.com/office/2006/metadata/properties" xmlns:ns2="f923dddb-0484-4a3c-b964-42bbf99f3400" xmlns:ns3="29da81e6-a6c1-4a47-a056-37f90d0d01b4" targetNamespace="http://schemas.microsoft.com/office/2006/metadata/properties" ma:root="true" ma:fieldsID="354d87e1e2dd931c70572a62bf6bc35a" ns2:_="" ns3:_="">
     <xsd:import namespace="f923dddb-0484-4a3c-b964-42bbf99f3400"/>
@@ -3346,17 +3354,6 @@
 </ct:contentTypeSchema>
 </file>
 
-<file path=customXml/item2.xml><?xml version="1.0" encoding="utf-8"?>
-<p:properties xmlns:p="http://schemas.microsoft.com/office/2006/metadata/properties" xmlns:xsi="http://www.w3.org/2001/XMLSchema-instance" xmlns:pc="http://schemas.microsoft.com/office/infopath/2007/PartnerControls">
-  <documentManagement>
-    <TaxCatchAll xmlns="29da81e6-a6c1-4a47-a056-37f90d0d01b4" xsi:nil="true"/>
-    <lcf76f155ced4ddcb4097134ff3c332f xmlns="f923dddb-0484-4a3c-b964-42bbf99f3400">
-      <Terms xmlns="http://schemas.microsoft.com/office/infopath/2007/PartnerControls"/>
-    </lcf76f155ced4ddcb4097134ff3c332f>
-  </documentManagement>
-</p:properties>
-</file>
-
 <file path=customXml/item3.xml><?xml version="1.0" encoding="utf-8"?>
 <?mso-contentType ?>
 <FormTemplates xmlns="http://schemas.microsoft.com/sharepoint/v3/contenttype/forms">
@@ -3367,6 +3364,23 @@
 </file>
 
 <file path=customXml/itemProps1.xml><?xml version="1.0" encoding="utf-8"?>
+<ds:datastoreItem xmlns:ds="http://schemas.openxmlformats.org/officeDocument/2006/customXml" ds:itemID="{BD8E1052-C526-4BE2-ABAB-4FFD9AE6D300}">
+  <ds:schemaRefs>
+    <ds:schemaRef ds:uri="29da81e6-a6c1-4a47-a056-37f90d0d01b4"/>
+    <ds:schemaRef ds:uri="f923dddb-0484-4a3c-b964-42bbf99f3400"/>
+    <ds:schemaRef ds:uri="http://purl.org/dc/dcmitype/"/>
+    <ds:schemaRef ds:uri="http://purl.org/dc/elements/1.1/"/>
+    <ds:schemaRef ds:uri="http://purl.org/dc/terms/"/>
+    <ds:schemaRef ds:uri="http://schemas.microsoft.com/office/2006/documentManagement/types"/>
+    <ds:schemaRef ds:uri="http://schemas.microsoft.com/office/2006/metadata/properties"/>
+    <ds:schemaRef ds:uri="http://schemas.microsoft.com/office/infopath/2007/PartnerControls"/>
+    <ds:schemaRef ds:uri="http://schemas.openxmlformats.org/package/2006/metadata/core-properties"/>
+    <ds:schemaRef ds:uri="http://www.w3.org/XML/1998/namespace"/>
+  </ds:schemaRefs>
+</ds:datastoreItem>
+</file>
+
+<file path=customXml/itemProps2.xml><?xml version="1.0" encoding="utf-8"?>
 <ds:datastoreItem xmlns:ds="http://schemas.openxmlformats.org/officeDocument/2006/customXml" ds:itemID="{B5C6FDB8-3E2B-413D-B9F6-095CFF42F312}">
   <ds:schemaRefs>
     <ds:schemaRef ds:uri="29da81e6-a6c1-4a47-a056-37f90d0d01b4"/>
@@ -3385,23 +3399,6 @@
 </ds:datastoreItem>
 </file>
 
-<file path=customXml/itemProps2.xml><?xml version="1.0" encoding="utf-8"?>
-<ds:datastoreItem xmlns:ds="http://schemas.openxmlformats.org/officeDocument/2006/customXml" ds:itemID="{BD8E1052-C526-4BE2-ABAB-4FFD9AE6D300}">
-  <ds:schemaRefs>
-    <ds:schemaRef ds:uri="29da81e6-a6c1-4a47-a056-37f90d0d01b4"/>
-    <ds:schemaRef ds:uri="f923dddb-0484-4a3c-b964-42bbf99f3400"/>
-    <ds:schemaRef ds:uri="http://purl.org/dc/dcmitype/"/>
-    <ds:schemaRef ds:uri="http://purl.org/dc/elements/1.1/"/>
-    <ds:schemaRef ds:uri="http://purl.org/dc/terms/"/>
-    <ds:schemaRef ds:uri="http://schemas.microsoft.com/office/2006/documentManagement/types"/>
-    <ds:schemaRef ds:uri="http://schemas.microsoft.com/office/2006/metadata/properties"/>
-    <ds:schemaRef ds:uri="http://schemas.microsoft.com/office/infopath/2007/PartnerControls"/>
-    <ds:schemaRef ds:uri="http://schemas.openxmlformats.org/package/2006/metadata/core-properties"/>
-    <ds:schemaRef ds:uri="http://www.w3.org/XML/1998/namespace"/>
-  </ds:schemaRefs>
-</ds:datastoreItem>
-</file>
-
 <file path=customXml/itemProps3.xml><?xml version="1.0" encoding="utf-8"?>
 <ds:datastoreItem xmlns:ds="http://schemas.openxmlformats.org/officeDocument/2006/customXml" ds:itemID="{3B88BAF6-F918-42BA-8235-7E362212CA12}">
   <ds:schemaRefs>

</xml_diff>

<commit_message>
Agenda: generacion de puntos.
</commit_message>
<xml_diff>
--- a/templates/template.pptx
+++ b/templates/template.pptx
@@ -862,7 +862,9 @@
           </a:bodyPr>
           <a:lstStyle>
             <a:lvl1pPr>
-              <a:defRPr lang="es-PE" sz="2400" i="0" dirty="0"/>
+              <a:defRPr lang="es-PE" sz="2400" b="0" i="0" dirty="0">
+                <a:latin typeface="+mn-lt"/>
+              </a:defRPr>
             </a:lvl1pPr>
           </a:lstStyle>
           <a:p>
@@ -891,7 +893,11 @@
         </p:spPr>
         <p:txBody>
           <a:bodyPr/>
-          <a:lstStyle/>
+          <a:lstStyle>
+            <a:lvl1pPr>
+              <a:defRPr sz="2800"/>
+            </a:lvl1pPr>
+          </a:lstStyle>
           <a:p>
             <a:endParaRPr lang="es-PE" dirty="0"/>
           </a:p>

</xml_diff>

<commit_message>
Propuesta arquitectura: insercion de diagrama
</commit_message>
<xml_diff>
--- a/templates/template.pptx
+++ b/templates/template.pptx
@@ -802,7 +802,7 @@
         </p:nvSpPr>
         <p:spPr>
           <a:xfrm>
-            <a:off x="852351" y="1643067"/>
+            <a:off x="852351" y="1182431"/>
             <a:ext cx="456248" cy="50482"/>
           </a:xfrm>
           <a:prstGeom prst="rect">
@@ -842,44 +842,6 @@
       </p:sp>
       <p:sp>
         <p:nvSpPr>
-          <p:cNvPr id="11" name="Marcador de contenido 2"/>
-          <p:cNvSpPr>
-            <a:spLocks noGrp="1"/>
-          </p:cNvSpPr>
-          <p:nvPr>
-            <p:ph idx="1"/>
-          </p:nvPr>
-        </p:nvSpPr>
-        <p:spPr>
-          <a:xfrm>
-            <a:off x="764540" y="1956118"/>
-            <a:ext cx="10515600" cy="3908234"/>
-          </a:xfrm>
-        </p:spPr>
-        <p:txBody>
-          <a:bodyPr vert="horz" lIns="91440" tIns="45720" rIns="91440" bIns="45720" rtlCol="0">
-            <a:normAutofit/>
-          </a:bodyPr>
-          <a:lstStyle>
-            <a:lvl1pPr>
-              <a:lnSpc>
-                <a:spcPct val="150000"/>
-              </a:lnSpc>
-              <a:defRPr lang="es-PE" sz="2400" b="0" i="0" dirty="0">
-                <a:latin typeface="+mn-lt"/>
-              </a:defRPr>
-            </a:lvl1pPr>
-          </a:lstStyle>
-          <a:p>
-            <a:pPr marL="0" lvl="0" indent="0">
-              <a:buNone/>
-            </a:pPr>
-            <a:endParaRPr lang="es-PE" dirty="0"/>
-          </a:p>
-        </p:txBody>
-      </p:sp>
-      <p:sp>
-        <p:nvSpPr>
           <p:cNvPr id="12" name="Título 1"/>
           <p:cNvSpPr>
             <a:spLocks noGrp="1"/>
@@ -890,12 +852,12 @@
         </p:nvSpPr>
         <p:spPr>
           <a:xfrm>
-            <a:off x="764540" y="707136"/>
-            <a:ext cx="10515600" cy="983552"/>
-          </a:xfrm>
-        </p:spPr>
-        <p:txBody>
-          <a:bodyPr anchor="ctr"/>
+            <a:off x="764539" y="707136"/>
+            <a:ext cx="10515600" cy="468000"/>
+          </a:xfrm>
+        </p:spPr>
+        <p:txBody>
+          <a:bodyPr anchor="t"/>
           <a:lstStyle>
             <a:lvl1pPr>
               <a:defRPr sz="2800"/>
@@ -906,11 +868,90 @@
           </a:p>
         </p:txBody>
       </p:sp>
+      <p:sp>
+        <p:nvSpPr>
+          <p:cNvPr id="3" name="Marcador de texto 2">
+            <a:extLst>
+              <a:ext uri="{FF2B5EF4-FFF2-40B4-BE49-F238E27FC236}">
+                <a16:creationId xmlns:a16="http://schemas.microsoft.com/office/drawing/2014/main" id="{22930C06-649B-BEA6-D50B-09E5D13FDC2A}"/>
+              </a:ext>
+            </a:extLst>
+          </p:cNvPr>
+          <p:cNvSpPr>
+            <a:spLocks noGrp="1"/>
+          </p:cNvSpPr>
+          <p:nvPr>
+            <p:ph type="body" sz="quarter" idx="12"/>
+          </p:nvPr>
+        </p:nvSpPr>
+        <p:spPr>
+          <a:xfrm>
+            <a:off x="764539" y="1375037"/>
+            <a:ext cx="10515600" cy="4486453"/>
+          </a:xfrm>
+        </p:spPr>
+        <p:txBody>
+          <a:bodyPr/>
+          <a:lstStyle/>
+          <a:p>
+            <a:pPr lvl="0"/>
+            <a:r>
+              <a:rPr lang="es-MX"/>
+              <a:t>Haga clic para modificar los estilos de texto del patrón</a:t>
+            </a:r>
+          </a:p>
+          <a:p>
+            <a:pPr lvl="1"/>
+            <a:r>
+              <a:rPr lang="es-MX"/>
+              <a:t>Segundo nivel</a:t>
+            </a:r>
+          </a:p>
+          <a:p>
+            <a:pPr lvl="2"/>
+            <a:r>
+              <a:rPr lang="es-MX"/>
+              <a:t>Tercer nivel</a:t>
+            </a:r>
+          </a:p>
+          <a:p>
+            <a:pPr lvl="3"/>
+            <a:r>
+              <a:rPr lang="es-MX"/>
+              <a:t>Cuarto nivel</a:t>
+            </a:r>
+          </a:p>
+          <a:p>
+            <a:pPr lvl="4"/>
+            <a:r>
+              <a:rPr lang="es-MX"/>
+              <a:t>Quinto nivel</a:t>
+            </a:r>
+            <a:endParaRPr lang="es-PE"/>
+          </a:p>
+        </p:txBody>
+      </p:sp>
     </p:spTree>
   </p:cSld>
   <p:clrMapOvr>
     <a:masterClrMapping/>
   </p:clrMapOvr>
+  <p:extLst>
+    <p:ext uri="{DCECCB84-F9BA-43D5-87BE-67443E8EF086}">
+      <p15:sldGuideLst xmlns:p15="http://schemas.microsoft.com/office/powerpoint/2012/main">
+        <p15:guide id="1" orient="horz" pos="2160" userDrawn="1">
+          <p15:clr>
+            <a:srgbClr val="FBAE40"/>
+          </p15:clr>
+        </p15:guide>
+        <p15:guide id="2" pos="3840" userDrawn="1">
+          <p15:clr>
+            <a:srgbClr val="FBAE40"/>
+          </p15:clr>
+        </p15:guide>
+      </p15:sldGuideLst>
+    </p:ext>
+  </p:extLst>
 </p:sldLayout>
 </file>
 
@@ -922,6 +963,17 @@
         <a:blipFill dpi="0" rotWithShape="1">
           <a:blip r:embed="rId2">
             <a:lum/>
+            <a:extLst>
+              <a:ext uri="{BEBA8EAE-BF5A-486C-A8C5-ECC9F3942E4B}">
+                <a14:imgProps xmlns:a14="http://schemas.microsoft.com/office/drawing/2010/main">
+                  <a14:imgLayer r:embed="rId3">
+                    <a14:imgEffect>
+                      <a14:sharpenSoften amount="50000"/>
+                    </a14:imgEffect>
+                  </a14:imgLayer>
+                </a14:imgProps>
+              </a:ext>
+            </a:extLst>
           </a:blip>
           <a:srcRect/>
           <a:stretch>
@@ -947,7 +999,53 @@
       </p:grpSpPr>
       <p:sp>
         <p:nvSpPr>
-          <p:cNvPr id="13" name="Título 5"/>
+          <p:cNvPr id="10" name="Rectángulo 9"/>
+          <p:cNvSpPr/>
+          <p:nvPr userDrawn="1"/>
+        </p:nvSpPr>
+        <p:spPr>
+          <a:xfrm>
+            <a:off x="852351" y="1182431"/>
+            <a:ext cx="456248" cy="50482"/>
+          </a:xfrm>
+          <a:prstGeom prst="rect">
+            <a:avLst/>
+          </a:prstGeom>
+          <a:solidFill>
+            <a:srgbClr val="D92E1C"/>
+          </a:solidFill>
+          <a:ln>
+            <a:noFill/>
+          </a:ln>
+        </p:spPr>
+        <p:style>
+          <a:lnRef idx="2">
+            <a:schemeClr val="accent1">
+              <a:shade val="50000"/>
+            </a:schemeClr>
+          </a:lnRef>
+          <a:fillRef idx="1">
+            <a:schemeClr val="accent1"/>
+          </a:fillRef>
+          <a:effectRef idx="0">
+            <a:schemeClr val="accent1"/>
+          </a:effectRef>
+          <a:fontRef idx="minor">
+            <a:schemeClr val="lt1"/>
+          </a:fontRef>
+        </p:style>
+        <p:txBody>
+          <a:bodyPr rtlCol="0" anchor="ctr"/>
+          <a:lstStyle/>
+          <a:p>
+            <a:pPr algn="ctr"/>
+            <a:endParaRPr lang="es-PE"/>
+          </a:p>
+        </p:txBody>
+      </p:sp>
+      <p:sp>
+        <p:nvSpPr>
+          <p:cNvPr id="12" name="Título 1"/>
           <p:cNvSpPr>
             <a:spLocks noGrp="1"/>
           </p:cNvSpPr>
@@ -957,12 +1055,12 @@
         </p:nvSpPr>
         <p:spPr>
           <a:xfrm>
-            <a:off x="781958" y="798286"/>
-            <a:ext cx="10515600" cy="892402"/>
-          </a:xfrm>
-        </p:spPr>
-        <p:txBody>
-          <a:bodyPr anchor="ctr"/>
+            <a:off x="763200" y="707136"/>
+            <a:ext cx="10515600" cy="468000"/>
+          </a:xfrm>
+        </p:spPr>
+        <p:txBody>
+          <a:bodyPr anchor="t"/>
           <a:lstStyle>
             <a:lvl1pPr>
               <a:defRPr sz="2800"/>
@@ -975,10 +1073,10 @@
       </p:sp>
       <p:sp>
         <p:nvSpPr>
-          <p:cNvPr id="3" name="Marcador de posición de imagen 2">
+          <p:cNvPr id="4" name="Marcador de posición de imagen 3">
             <a:extLst>
               <a:ext uri="{FF2B5EF4-FFF2-40B4-BE49-F238E27FC236}">
-                <a16:creationId xmlns:a16="http://schemas.microsoft.com/office/drawing/2014/main" id="{0F6C121F-0ED2-16F4-03B3-BC9C241F6B3C}"/>
+                <a16:creationId xmlns:a16="http://schemas.microsoft.com/office/drawing/2014/main" id="{FA3104DB-FEEA-4FB8-532C-957AC18923A3}"/>
               </a:ext>
             </a:extLst>
           </p:cNvPr>
@@ -986,13 +1084,13 @@
             <a:spLocks noGrp="1"/>
           </p:cNvSpPr>
           <p:nvPr>
-            <p:ph type="pic" sz="quarter" idx="10"/>
+            <p:ph type="pic" sz="quarter" idx="11"/>
           </p:nvPr>
         </p:nvSpPr>
         <p:spPr>
           <a:xfrm>
-            <a:off x="781958" y="1839061"/>
-            <a:ext cx="10515600" cy="3891600"/>
+            <a:off x="763200" y="1375200"/>
+            <a:ext cx="10515600" cy="4485600"/>
           </a:xfrm>
         </p:spPr>
         <p:txBody>
@@ -1004,6 +1102,11 @@
         </p:txBody>
       </p:sp>
     </p:spTree>
+    <p:extLst>
+      <p:ext uri="{BB962C8B-B14F-4D97-AF65-F5344CB8AC3E}">
+        <p14:creationId xmlns:p14="http://schemas.microsoft.com/office/powerpoint/2010/main" val="3805580153"/>
+      </p:ext>
+    </p:extLst>
   </p:cSld>
   <p:clrMapOvr>
     <a:masterClrMapping/>
@@ -1913,7 +2016,7 @@
   <p:sldLayoutIdLst>
     <p:sldLayoutId id="2147483649" r:id="rId1"/>
     <p:sldLayoutId id="2147483650" r:id="rId2"/>
-    <p:sldLayoutId id="2147483652" r:id="rId3"/>
+    <p:sldLayoutId id="2147483660" r:id="rId3"/>
     <p:sldLayoutId id="2147483651" r:id="rId4"/>
     <p:sldLayoutId id="2147483653" r:id="rId5"/>
     <p:sldLayoutId id="2147483654" r:id="rId6"/>

</xml_diff>